<commit_message>
fixed json button save file bug
</commit_message>
<xml_diff>
--- a/manual.pptx
+++ b/manual.pptx
@@ -26,7 +26,8 @@
     <p:sldId id="272" r:id="rId20"/>
     <p:sldId id="273" r:id="rId21"/>
     <p:sldId id="274" r:id="rId22"/>
-    <p:sldId id="275" r:id="rId23"/>
+    <p:sldId id="278" r:id="rId23"/>
+    <p:sldId id="275" r:id="rId24"/>
   </p:sldIdLst>
   <p:sldSz cx="12192000" cy="6858000"/>
   <p:notesSz cx="6858000" cy="9144000"/>
@@ -280,7 +281,7 @@
           <a:p>
             <a:fld id="{EE998CF9-EECA-4A21-9291-010F8FD37F78}" type="datetimeFigureOut">
               <a:rPr lang="de-DE" smtClean="0"/>
-              <a:t>27.02.2025</a:t>
+              <a:t>04.03.2025</a:t>
             </a:fld>
             <a:endParaRPr lang="de-DE"/>
           </a:p>
@@ -478,7 +479,7 @@
           <a:p>
             <a:fld id="{EE998CF9-EECA-4A21-9291-010F8FD37F78}" type="datetimeFigureOut">
               <a:rPr lang="de-DE" smtClean="0"/>
-              <a:t>27.02.2025</a:t>
+              <a:t>04.03.2025</a:t>
             </a:fld>
             <a:endParaRPr lang="de-DE"/>
           </a:p>
@@ -686,7 +687,7 @@
           <a:p>
             <a:fld id="{EE998CF9-EECA-4A21-9291-010F8FD37F78}" type="datetimeFigureOut">
               <a:rPr lang="de-DE" smtClean="0"/>
-              <a:t>27.02.2025</a:t>
+              <a:t>04.03.2025</a:t>
             </a:fld>
             <a:endParaRPr lang="de-DE"/>
           </a:p>
@@ -884,7 +885,7 @@
           <a:p>
             <a:fld id="{EE998CF9-EECA-4A21-9291-010F8FD37F78}" type="datetimeFigureOut">
               <a:rPr lang="de-DE" smtClean="0"/>
-              <a:t>27.02.2025</a:t>
+              <a:t>04.03.2025</a:t>
             </a:fld>
             <a:endParaRPr lang="de-DE"/>
           </a:p>
@@ -1159,7 +1160,7 @@
           <a:p>
             <a:fld id="{EE998CF9-EECA-4A21-9291-010F8FD37F78}" type="datetimeFigureOut">
               <a:rPr lang="de-DE" smtClean="0"/>
-              <a:t>27.02.2025</a:t>
+              <a:t>04.03.2025</a:t>
             </a:fld>
             <a:endParaRPr lang="de-DE"/>
           </a:p>
@@ -1424,7 +1425,7 @@
           <a:p>
             <a:fld id="{EE998CF9-EECA-4A21-9291-010F8FD37F78}" type="datetimeFigureOut">
               <a:rPr lang="de-DE" smtClean="0"/>
-              <a:t>27.02.2025</a:t>
+              <a:t>04.03.2025</a:t>
             </a:fld>
             <a:endParaRPr lang="de-DE"/>
           </a:p>
@@ -1836,7 +1837,7 @@
           <a:p>
             <a:fld id="{EE998CF9-EECA-4A21-9291-010F8FD37F78}" type="datetimeFigureOut">
               <a:rPr lang="de-DE" smtClean="0"/>
-              <a:t>27.02.2025</a:t>
+              <a:t>04.03.2025</a:t>
             </a:fld>
             <a:endParaRPr lang="de-DE"/>
           </a:p>
@@ -1977,7 +1978,7 @@
           <a:p>
             <a:fld id="{EE998CF9-EECA-4A21-9291-010F8FD37F78}" type="datetimeFigureOut">
               <a:rPr lang="de-DE" smtClean="0"/>
-              <a:t>27.02.2025</a:t>
+              <a:t>04.03.2025</a:t>
             </a:fld>
             <a:endParaRPr lang="de-DE"/>
           </a:p>
@@ -2090,7 +2091,7 @@
           <a:p>
             <a:fld id="{EE998CF9-EECA-4A21-9291-010F8FD37F78}" type="datetimeFigureOut">
               <a:rPr lang="de-DE" smtClean="0"/>
-              <a:t>27.02.2025</a:t>
+              <a:t>04.03.2025</a:t>
             </a:fld>
             <a:endParaRPr lang="de-DE"/>
           </a:p>
@@ -2401,7 +2402,7 @@
           <a:p>
             <a:fld id="{EE998CF9-EECA-4A21-9291-010F8FD37F78}" type="datetimeFigureOut">
               <a:rPr lang="de-DE" smtClean="0"/>
-              <a:t>27.02.2025</a:t>
+              <a:t>04.03.2025</a:t>
             </a:fld>
             <a:endParaRPr lang="de-DE"/>
           </a:p>
@@ -2689,7 +2690,7 @@
           <a:p>
             <a:fld id="{EE998CF9-EECA-4A21-9291-010F8FD37F78}" type="datetimeFigureOut">
               <a:rPr lang="de-DE" smtClean="0"/>
-              <a:t>27.02.2025</a:t>
+              <a:t>04.03.2025</a:t>
             </a:fld>
             <a:endParaRPr lang="de-DE"/>
           </a:p>
@@ -2930,7 +2931,7 @@
           <a:p>
             <a:fld id="{EE998CF9-EECA-4A21-9291-010F8FD37F78}" type="datetimeFigureOut">
               <a:rPr lang="de-DE" smtClean="0"/>
-              <a:t>27.02.2025</a:t>
+              <a:t>04.03.2025</a:t>
             </a:fld>
             <a:endParaRPr lang="de-DE"/>
           </a:p>
@@ -15685,7 +15686,7 @@
                   <a:srgbClr val="FF0000"/>
                 </a:solidFill>
               </a:rPr>
-              <a:t>you</a:t>
+              <a:t>your</a:t>
             </a:r>
             <a:r>
               <a:rPr lang="de-DE" b="1" dirty="0">
@@ -15725,7 +15726,7 @@
                   <a:srgbClr val="FF0000"/>
                 </a:solidFill>
               </a:rPr>
-              <a:t>.</a:t>
+              <a:t>!!!</a:t>
             </a:r>
           </a:p>
         </p:txBody>
@@ -16225,7 +16226,7 @@
         <p:spPr>
           <a:xfrm>
             <a:off x="4629572" y="5474851"/>
-            <a:ext cx="1994747" cy="1223412"/>
+            <a:ext cx="1994747" cy="1384995"/>
           </a:xfrm>
           <a:prstGeom prst="rect">
             <a:avLst/>
@@ -16284,7 +16285,7 @@
                   <a:schemeClr val="bg1"/>
                 </a:solidFill>
               </a:rPr>
-              <a:t> </a:t>
+              <a:t> 192.168.0.143 </a:t>
             </a:r>
             <a:r>
               <a:rPr lang="de-DE" sz="1050" b="1" dirty="0" err="1">
@@ -16292,6 +16293,22 @@
                   <a:schemeClr val="bg1"/>
                 </a:solidFill>
               </a:rPr>
+              <a:t>using</a:t>
+            </a:r>
+            <a:r>
+              <a:rPr lang="de-DE" sz="1050" b="1" dirty="0">
+                <a:solidFill>
+                  <a:schemeClr val="bg1"/>
+                </a:solidFill>
+              </a:rPr>
+              <a:t> </a:t>
+            </a:r>
+            <a:r>
+              <a:rPr lang="de-DE" sz="1050" b="1" dirty="0" err="1">
+                <a:solidFill>
+                  <a:schemeClr val="bg1"/>
+                </a:solidFill>
+              </a:rPr>
               <a:t>default</a:t>
             </a:r>
             <a:r>
@@ -16300,7 +16317,7 @@
                   <a:schemeClr val="bg1"/>
                 </a:solidFill>
               </a:rPr>
-              <a:t> 192.168.0.142 </a:t>
+              <a:t> </a:t>
             </a:r>
             <a:r>
               <a:rPr lang="de-DE" sz="1050" b="1" dirty="0" err="1">
@@ -16308,23 +16325,7 @@
                   <a:schemeClr val="bg1"/>
                 </a:solidFill>
               </a:rPr>
-              <a:t>using</a:t>
-            </a:r>
-            <a:r>
-              <a:rPr lang="de-DE" sz="1050" b="1" dirty="0">
-                <a:solidFill>
-                  <a:schemeClr val="bg1"/>
-                </a:solidFill>
-              </a:rPr>
-              <a:t> </a:t>
-            </a:r>
-            <a:r>
-              <a:rPr lang="de-DE" sz="1050" b="1" dirty="0" err="1">
-                <a:solidFill>
-                  <a:schemeClr val="bg1"/>
-                </a:solidFill>
-              </a:rPr>
-              <a:t>default</a:t>
+              <a:t>protocol</a:t>
             </a:r>
             <a:r>
               <a:rPr lang="de-DE" sz="1050" b="1" dirty="0">
@@ -17322,6 +17323,1538 @@
 </file>
 
 <file path=ppt/slides/slide22.xml><?xml version="1.0" encoding="utf-8"?>
+<p:sld xmlns:a="http://schemas.openxmlformats.org/drawingml/2006/main" xmlns:r="http://schemas.openxmlformats.org/officeDocument/2006/relationships" xmlns:p="http://schemas.openxmlformats.org/presentationml/2006/main">
+  <p:cSld>
+    <p:spTree>
+      <p:nvGrpSpPr>
+        <p:cNvPr id="1" name=""/>
+        <p:cNvGrpSpPr/>
+        <p:nvPr/>
+      </p:nvGrpSpPr>
+      <p:grpSpPr>
+        <a:xfrm>
+          <a:off x="0" y="0"/>
+          <a:ext cx="0" cy="0"/>
+          <a:chOff x="0" y="0"/>
+          <a:chExt cx="0" cy="0"/>
+        </a:xfrm>
+      </p:grpSpPr>
+      <p:pic>
+        <p:nvPicPr>
+          <p:cNvPr id="44" name="Grafik 43">
+            <a:extLst>
+              <a:ext uri="{FF2B5EF4-FFF2-40B4-BE49-F238E27FC236}">
+                <a16:creationId xmlns:a16="http://schemas.microsoft.com/office/drawing/2014/main" id="{B5151977-40FB-40DB-9EBE-EFF5E87A398E}"/>
+              </a:ext>
+            </a:extLst>
+          </p:cNvPr>
+          <p:cNvPicPr>
+            <a:picLocks noChangeAspect="1"/>
+          </p:cNvPicPr>
+          <p:nvPr/>
+        </p:nvPicPr>
+        <p:blipFill rotWithShape="1">
+          <a:blip r:embed="rId2">
+            <a:extLst>
+              <a:ext uri="{28A0092B-C50C-407E-A947-70E740481C1C}">
+                <a14:useLocalDpi xmlns:a14="http://schemas.microsoft.com/office/drawing/2010/main" val="0"/>
+              </a:ext>
+            </a:extLst>
+          </a:blip>
+          <a:srcRect t="39357" b="9298"/>
+          <a:stretch/>
+        </p:blipFill>
+        <p:spPr>
+          <a:xfrm>
+            <a:off x="0" y="1270528"/>
+            <a:ext cx="12192000" cy="5670231"/>
+          </a:xfrm>
+          <a:prstGeom prst="rect">
+            <a:avLst/>
+          </a:prstGeom>
+        </p:spPr>
+      </p:pic>
+      <p:sp>
+        <p:nvSpPr>
+          <p:cNvPr id="36" name="Rechteck 35">
+            <a:extLst>
+              <a:ext uri="{FF2B5EF4-FFF2-40B4-BE49-F238E27FC236}">
+                <a16:creationId xmlns:a16="http://schemas.microsoft.com/office/drawing/2014/main" id="{4CEE5FD8-C530-401F-8942-48582D230FE8}"/>
+              </a:ext>
+            </a:extLst>
+          </p:cNvPr>
+          <p:cNvSpPr/>
+          <p:nvPr/>
+        </p:nvSpPr>
+        <p:spPr>
+          <a:xfrm rot="16200000">
+            <a:off x="-2827281" y="2835830"/>
+            <a:ext cx="6850540" cy="1193800"/>
+          </a:xfrm>
+          <a:prstGeom prst="rect">
+            <a:avLst/>
+          </a:prstGeom>
+        </p:spPr>
+        <p:style>
+          <a:lnRef idx="2">
+            <a:schemeClr val="dk1">
+              <a:shade val="50000"/>
+            </a:schemeClr>
+          </a:lnRef>
+          <a:fillRef idx="1">
+            <a:schemeClr val="dk1"/>
+          </a:fillRef>
+          <a:effectRef idx="0">
+            <a:schemeClr val="dk1"/>
+          </a:effectRef>
+          <a:fontRef idx="minor">
+            <a:schemeClr val="lt1"/>
+          </a:fontRef>
+        </p:style>
+        <p:txBody>
+          <a:bodyPr rtlCol="0" anchor="ctr"/>
+          <a:lstStyle/>
+          <a:p>
+            <a:pPr algn="ctr"/>
+            <a:r>
+              <a:rPr lang="de-DE" sz="3600" b="1" dirty="0" err="1">
+                <a:latin typeface="Arial" panose="020B0604020202020204" pitchFamily="34" charset="0"/>
+                <a:cs typeface="Arial" panose="020B0604020202020204" pitchFamily="34" charset="0"/>
+              </a:rPr>
+              <a:t>Super.Station.Automation</a:t>
+            </a:r>
+            <a:endParaRPr lang="de-DE" b="1" dirty="0">
+              <a:latin typeface="Arial" panose="020B0604020202020204" pitchFamily="34" charset="0"/>
+              <a:cs typeface="Arial" panose="020B0604020202020204" pitchFamily="34" charset="0"/>
+            </a:endParaRPr>
+          </a:p>
+        </p:txBody>
+      </p:sp>
+      <p:sp>
+        <p:nvSpPr>
+          <p:cNvPr id="37" name="Textfeld 36">
+            <a:extLst>
+              <a:ext uri="{FF2B5EF4-FFF2-40B4-BE49-F238E27FC236}">
+                <a16:creationId xmlns:a16="http://schemas.microsoft.com/office/drawing/2014/main" id="{700670FB-16C5-4D5B-A495-25756B700130}"/>
+              </a:ext>
+            </a:extLst>
+          </p:cNvPr>
+          <p:cNvSpPr txBox="1"/>
+          <p:nvPr/>
+        </p:nvSpPr>
+        <p:spPr>
+          <a:xfrm>
+            <a:off x="218529" y="6226818"/>
+            <a:ext cx="800219" cy="646331"/>
+          </a:xfrm>
+          <a:prstGeom prst="rect">
+            <a:avLst/>
+          </a:prstGeom>
+          <a:noFill/>
+        </p:spPr>
+        <p:txBody>
+          <a:bodyPr wrap="none" rtlCol="0">
+            <a:spAutoFit/>
+          </a:bodyPr>
+          <a:lstStyle/>
+          <a:p>
+            <a:r>
+              <a:rPr lang="de-DE" sz="3600" b="1" dirty="0">
+                <a:solidFill>
+                  <a:srgbClr val="FF0000"/>
+                </a:solidFill>
+                <a:latin typeface="Arial" panose="020B0604020202020204" pitchFamily="34" charset="0"/>
+                <a:cs typeface="Arial" panose="020B0604020202020204" pitchFamily="34" charset="0"/>
+              </a:rPr>
+              <a:t>XX</a:t>
+            </a:r>
+            <a:endParaRPr lang="de-DE" b="1" dirty="0">
+              <a:solidFill>
+                <a:srgbClr val="FF0000"/>
+              </a:solidFill>
+              <a:latin typeface="Arial" panose="020B0604020202020204" pitchFamily="34" charset="0"/>
+              <a:cs typeface="Arial" panose="020B0604020202020204" pitchFamily="34" charset="0"/>
+            </a:endParaRPr>
+          </a:p>
+        </p:txBody>
+      </p:sp>
+      <p:sp>
+        <p:nvSpPr>
+          <p:cNvPr id="14" name="Textfeld 13">
+            <a:extLst>
+              <a:ext uri="{FF2B5EF4-FFF2-40B4-BE49-F238E27FC236}">
+                <a16:creationId xmlns:a16="http://schemas.microsoft.com/office/drawing/2014/main" id="{8130297A-2852-4B67-A8C6-F061815912F4}"/>
+              </a:ext>
+            </a:extLst>
+          </p:cNvPr>
+          <p:cNvSpPr txBox="1"/>
+          <p:nvPr/>
+        </p:nvSpPr>
+        <p:spPr>
+          <a:xfrm>
+            <a:off x="2095500" y="540393"/>
+            <a:ext cx="8999220" cy="646331"/>
+          </a:xfrm>
+          <a:prstGeom prst="rect">
+            <a:avLst/>
+          </a:prstGeom>
+          <a:noFill/>
+        </p:spPr>
+        <p:txBody>
+          <a:bodyPr wrap="square" rtlCol="0">
+            <a:spAutoFit/>
+          </a:bodyPr>
+          <a:lstStyle/>
+          <a:p>
+            <a:r>
+              <a:rPr lang="de-DE" sz="3600" b="1" dirty="0" err="1"/>
+              <a:t>How</a:t>
+            </a:r>
+            <a:r>
+              <a:rPr lang="de-DE" sz="3600" b="1" dirty="0"/>
+              <a:t> </a:t>
+            </a:r>
+            <a:r>
+              <a:rPr lang="de-DE" sz="3600" b="1" dirty="0" err="1"/>
+              <a:t>to</a:t>
+            </a:r>
+            <a:r>
+              <a:rPr lang="de-DE" sz="3600" b="1" dirty="0"/>
+              <a:t> SAVE/RECALL </a:t>
+            </a:r>
+            <a:r>
+              <a:rPr lang="de-DE" sz="3600" b="1" dirty="0" err="1"/>
+              <a:t>controllerstates</a:t>
+            </a:r>
+            <a:r>
+              <a:rPr lang="de-DE" sz="3600" b="1" dirty="0"/>
+              <a:t>?</a:t>
+            </a:r>
+          </a:p>
+        </p:txBody>
+      </p:sp>
+      <p:sp>
+        <p:nvSpPr>
+          <p:cNvPr id="16" name="Textfeld 15">
+            <a:extLst>
+              <a:ext uri="{FF2B5EF4-FFF2-40B4-BE49-F238E27FC236}">
+                <a16:creationId xmlns:a16="http://schemas.microsoft.com/office/drawing/2014/main" id="{C737315C-235B-4C64-BEE7-74BACECE3696}"/>
+              </a:ext>
+            </a:extLst>
+          </p:cNvPr>
+          <p:cNvSpPr txBox="1"/>
+          <p:nvPr/>
+        </p:nvSpPr>
+        <p:spPr>
+          <a:xfrm>
+            <a:off x="2095501" y="1695094"/>
+            <a:ext cx="9798472" cy="2677656"/>
+          </a:xfrm>
+          <a:prstGeom prst="rect">
+            <a:avLst/>
+          </a:prstGeom>
+          <a:noFill/>
+        </p:spPr>
+        <p:txBody>
+          <a:bodyPr wrap="square" rtlCol="0">
+            <a:spAutoFit/>
+          </a:bodyPr>
+          <a:lstStyle/>
+          <a:p>
+            <a:pPr marL="228600" indent="-228600">
+              <a:buFont typeface="+mj-lt"/>
+              <a:buAutoNum type="arabicPeriod"/>
+            </a:pPr>
+            <a:r>
+              <a:rPr lang="de-DE" sz="1200" b="1" dirty="0" err="1">
+                <a:solidFill>
+                  <a:srgbClr val="FF0000"/>
+                </a:solidFill>
+              </a:rPr>
+              <a:t>Make</a:t>
+            </a:r>
+            <a:r>
+              <a:rPr lang="de-DE" sz="1200" b="1" dirty="0">
+                <a:solidFill>
+                  <a:srgbClr val="FF0000"/>
+                </a:solidFill>
+              </a:rPr>
+              <a:t> </a:t>
+            </a:r>
+            <a:r>
+              <a:rPr lang="de-DE" sz="1200" b="1" dirty="0" err="1">
+                <a:solidFill>
+                  <a:srgbClr val="FF0000"/>
+                </a:solidFill>
+              </a:rPr>
+              <a:t>sure</a:t>
+            </a:r>
+            <a:r>
+              <a:rPr lang="de-DE" sz="1200" b="1" dirty="0">
+                <a:solidFill>
+                  <a:srgbClr val="FF0000"/>
+                </a:solidFill>
+              </a:rPr>
+              <a:t>, all </a:t>
+            </a:r>
+            <a:r>
+              <a:rPr lang="de-DE" sz="1200" b="1" dirty="0" err="1">
+                <a:solidFill>
+                  <a:srgbClr val="FF0000"/>
+                </a:solidFill>
+              </a:rPr>
+              <a:t>controllers</a:t>
+            </a:r>
+            <a:r>
+              <a:rPr lang="de-DE" sz="1200" b="1" dirty="0">
+                <a:solidFill>
+                  <a:srgbClr val="FF0000"/>
+                </a:solidFill>
+              </a:rPr>
+              <a:t> </a:t>
+            </a:r>
+            <a:r>
+              <a:rPr lang="de-DE" sz="1200" b="1" dirty="0" err="1">
+                <a:solidFill>
+                  <a:srgbClr val="FF0000"/>
+                </a:solidFill>
+              </a:rPr>
+              <a:t>who</a:t>
+            </a:r>
+            <a:r>
+              <a:rPr lang="de-DE" sz="1200" b="1" dirty="0">
+                <a:solidFill>
+                  <a:srgbClr val="FF0000"/>
+                </a:solidFill>
+              </a:rPr>
+              <a:t> </a:t>
+            </a:r>
+            <a:r>
+              <a:rPr lang="de-DE" sz="1200" b="1" dirty="0" err="1">
+                <a:solidFill>
+                  <a:srgbClr val="FF0000"/>
+                </a:solidFill>
+              </a:rPr>
+              <a:t>shd</a:t>
+            </a:r>
+            <a:r>
+              <a:rPr lang="de-DE" sz="1200" b="1" dirty="0">
+                <a:solidFill>
+                  <a:srgbClr val="FF0000"/>
+                </a:solidFill>
+              </a:rPr>
+              <a:t> </a:t>
+            </a:r>
+            <a:r>
+              <a:rPr lang="de-DE" sz="1200" b="1" dirty="0" err="1">
+                <a:solidFill>
+                  <a:srgbClr val="FF0000"/>
+                </a:solidFill>
+              </a:rPr>
+              <a:t>be</a:t>
+            </a:r>
+            <a:r>
+              <a:rPr lang="de-DE" sz="1200" b="1" dirty="0">
+                <a:solidFill>
+                  <a:srgbClr val="FF0000"/>
+                </a:solidFill>
+              </a:rPr>
+              <a:t> </a:t>
+            </a:r>
+            <a:r>
+              <a:rPr lang="de-DE" sz="1200" b="1" dirty="0" err="1">
+                <a:solidFill>
+                  <a:srgbClr val="FF0000"/>
+                </a:solidFill>
+              </a:rPr>
+              <a:t>part</a:t>
+            </a:r>
+            <a:r>
+              <a:rPr lang="de-DE" sz="1200" b="1" dirty="0">
+                <a:solidFill>
+                  <a:srgbClr val="FF0000"/>
+                </a:solidFill>
+              </a:rPr>
+              <a:t> of </a:t>
+            </a:r>
+            <a:r>
+              <a:rPr lang="de-DE" sz="1200" b="1" dirty="0" err="1">
+                <a:solidFill>
+                  <a:srgbClr val="FF0000"/>
+                </a:solidFill>
+              </a:rPr>
+              <a:t>your</a:t>
+            </a:r>
+            <a:r>
+              <a:rPr lang="de-DE" sz="1200" b="1" dirty="0">
+                <a:solidFill>
+                  <a:srgbClr val="FF0000"/>
+                </a:solidFill>
+              </a:rPr>
+              <a:t> </a:t>
+            </a:r>
+            <a:r>
+              <a:rPr lang="de-DE" sz="1200" b="1" dirty="0" err="1">
+                <a:solidFill>
+                  <a:srgbClr val="FF0000"/>
+                </a:solidFill>
+              </a:rPr>
+              <a:t>current</a:t>
+            </a:r>
+            <a:r>
+              <a:rPr lang="de-DE" sz="1200" b="1" dirty="0">
+                <a:solidFill>
+                  <a:srgbClr val="FF0000"/>
+                </a:solidFill>
+              </a:rPr>
+              <a:t> </a:t>
+            </a:r>
+            <a:r>
+              <a:rPr lang="de-DE" sz="1200" b="1" dirty="0" err="1">
+                <a:solidFill>
+                  <a:srgbClr val="FF0000"/>
+                </a:solidFill>
+              </a:rPr>
+              <a:t>setup</a:t>
+            </a:r>
+            <a:r>
+              <a:rPr lang="de-DE" sz="1200" b="1" dirty="0">
+                <a:solidFill>
+                  <a:srgbClr val="FF0000"/>
+                </a:solidFill>
+              </a:rPr>
+              <a:t> (</a:t>
+            </a:r>
+            <a:r>
+              <a:rPr lang="de-DE" sz="1200" b="1" dirty="0" err="1">
+                <a:solidFill>
+                  <a:srgbClr val="FF0000"/>
+                </a:solidFill>
+              </a:rPr>
+              <a:t>to</a:t>
+            </a:r>
+            <a:r>
+              <a:rPr lang="de-DE" sz="1200" b="1" dirty="0">
+                <a:solidFill>
+                  <a:srgbClr val="FF0000"/>
+                </a:solidFill>
+              </a:rPr>
+              <a:t> </a:t>
+            </a:r>
+            <a:r>
+              <a:rPr lang="de-DE" sz="1200" b="1" dirty="0" err="1">
+                <a:solidFill>
+                  <a:srgbClr val="FF0000"/>
+                </a:solidFill>
+              </a:rPr>
+              <a:t>be</a:t>
+            </a:r>
+            <a:r>
+              <a:rPr lang="de-DE" sz="1200" b="1" dirty="0">
+                <a:solidFill>
+                  <a:srgbClr val="FF0000"/>
+                </a:solidFill>
+              </a:rPr>
+              <a:t> </a:t>
+            </a:r>
+            <a:r>
+              <a:rPr lang="de-DE" sz="1200" b="1" dirty="0" err="1">
+                <a:solidFill>
+                  <a:srgbClr val="FF0000"/>
+                </a:solidFill>
+              </a:rPr>
+              <a:t>stored</a:t>
+            </a:r>
+            <a:r>
+              <a:rPr lang="de-DE" sz="1200" b="1" dirty="0">
+                <a:solidFill>
+                  <a:srgbClr val="FF0000"/>
+                </a:solidFill>
+              </a:rPr>
+              <a:t> and </a:t>
+            </a:r>
+            <a:r>
+              <a:rPr lang="de-DE" sz="1200" b="1" dirty="0" err="1">
+                <a:solidFill>
+                  <a:srgbClr val="FF0000"/>
+                </a:solidFill>
+              </a:rPr>
+              <a:t>recalled</a:t>
+            </a:r>
+            <a:r>
+              <a:rPr lang="de-DE" sz="1200" b="1" dirty="0">
+                <a:solidFill>
+                  <a:srgbClr val="FF0000"/>
+                </a:solidFill>
+              </a:rPr>
+              <a:t>) </a:t>
+            </a:r>
+            <a:r>
+              <a:rPr lang="de-DE" sz="1200" b="1" dirty="0" err="1">
+                <a:solidFill>
+                  <a:srgbClr val="FF0000"/>
+                </a:solidFill>
+              </a:rPr>
+              <a:t>are</a:t>
+            </a:r>
+            <a:r>
+              <a:rPr lang="de-DE" sz="1200" b="1" dirty="0">
+                <a:solidFill>
+                  <a:srgbClr val="FF0000"/>
+                </a:solidFill>
+              </a:rPr>
+              <a:t> ONLINE/AVAIBLE/ON</a:t>
+            </a:r>
+          </a:p>
+          <a:p>
+            <a:pPr marL="228600" indent="-228600">
+              <a:buFont typeface="+mj-lt"/>
+              <a:buAutoNum type="arabicPeriod"/>
+            </a:pPr>
+            <a:r>
+              <a:rPr lang="de-DE" sz="1200" dirty="0"/>
+              <a:t>Load </a:t>
+            </a:r>
+            <a:r>
+              <a:rPr lang="de-DE" sz="1200" dirty="0" err="1"/>
+              <a:t>your</a:t>
+            </a:r>
+            <a:r>
+              <a:rPr lang="de-DE" sz="1200" dirty="0"/>
+              <a:t> </a:t>
+            </a:r>
+            <a:r>
+              <a:rPr lang="de-DE" sz="1200" dirty="0" err="1"/>
+              <a:t>controllersetup</a:t>
+            </a:r>
+            <a:endParaRPr lang="de-DE" sz="1200" dirty="0"/>
+          </a:p>
+          <a:p>
+            <a:pPr marL="228600" indent="-228600">
+              <a:buFont typeface="+mj-lt"/>
+              <a:buAutoNum type="arabicPeriod"/>
+            </a:pPr>
+            <a:r>
+              <a:rPr lang="de-DE" sz="1200" dirty="0"/>
+              <a:t>Edit </a:t>
+            </a:r>
+            <a:r>
+              <a:rPr lang="de-DE" sz="1200" dirty="0" err="1"/>
+              <a:t>the</a:t>
+            </a:r>
+            <a:r>
+              <a:rPr lang="de-DE" sz="1200" dirty="0"/>
+              <a:t> </a:t>
+            </a:r>
+            <a:r>
+              <a:rPr lang="de-DE" sz="1200" dirty="0" err="1"/>
+              <a:t>controllersetup</a:t>
+            </a:r>
+            <a:r>
+              <a:rPr lang="de-DE" sz="1200" dirty="0"/>
+              <a:t>, </a:t>
+            </a:r>
+            <a:r>
+              <a:rPr lang="de-DE" sz="1200" dirty="0" err="1"/>
+              <a:t>change</a:t>
+            </a:r>
+            <a:r>
+              <a:rPr lang="de-DE" sz="1200" dirty="0"/>
+              <a:t> </a:t>
+            </a:r>
+            <a:r>
+              <a:rPr lang="de-DE" sz="1200" dirty="0" err="1"/>
+              <a:t>settings</a:t>
+            </a:r>
+            <a:r>
+              <a:rPr lang="de-DE" sz="1200" dirty="0"/>
+              <a:t>, </a:t>
+            </a:r>
+            <a:r>
+              <a:rPr lang="de-DE" sz="1200" dirty="0" err="1"/>
+              <a:t>add</a:t>
+            </a:r>
+            <a:r>
+              <a:rPr lang="de-DE" sz="1200" dirty="0"/>
+              <a:t> </a:t>
+            </a:r>
+            <a:r>
+              <a:rPr lang="de-DE" sz="1200" dirty="0" err="1"/>
+              <a:t>or</a:t>
+            </a:r>
+            <a:r>
+              <a:rPr lang="de-DE" sz="1200" dirty="0"/>
+              <a:t> </a:t>
+            </a:r>
+            <a:r>
+              <a:rPr lang="de-DE" sz="1200" dirty="0" err="1"/>
+              <a:t>remove</a:t>
+            </a:r>
+            <a:r>
+              <a:rPr lang="de-DE" sz="1200" dirty="0"/>
+              <a:t> </a:t>
+            </a:r>
+            <a:r>
+              <a:rPr lang="de-DE" sz="1200" dirty="0" err="1"/>
+              <a:t>controllers</a:t>
+            </a:r>
+            <a:endParaRPr lang="de-DE" sz="1200" dirty="0"/>
+          </a:p>
+          <a:p>
+            <a:pPr marL="228600" indent="-228600">
+              <a:buFont typeface="+mj-lt"/>
+              <a:buAutoNum type="arabicPeriod"/>
+            </a:pPr>
+            <a:r>
+              <a:rPr lang="de-DE" sz="1200" dirty="0"/>
+              <a:t>Save </a:t>
+            </a:r>
+            <a:r>
+              <a:rPr lang="de-DE" sz="1200" dirty="0" err="1"/>
+              <a:t>the</a:t>
+            </a:r>
+            <a:r>
+              <a:rPr lang="de-DE" sz="1200" dirty="0"/>
+              <a:t> Controllersetup </a:t>
+            </a:r>
+            <a:r>
+              <a:rPr lang="de-DE" sz="1200" dirty="0" err="1"/>
+              <a:t>to</a:t>
+            </a:r>
+            <a:r>
+              <a:rPr lang="de-DE" sz="1200" dirty="0"/>
+              <a:t> a </a:t>
+            </a:r>
+            <a:r>
+              <a:rPr lang="de-DE" sz="1200" dirty="0" err="1"/>
+              <a:t>file</a:t>
+            </a:r>
+            <a:r>
+              <a:rPr lang="de-DE" sz="1200" dirty="0"/>
+              <a:t> (</a:t>
+            </a:r>
+            <a:r>
+              <a:rPr lang="de-DE" sz="1200" dirty="0" err="1"/>
+              <a:t>overwrite</a:t>
+            </a:r>
+            <a:r>
+              <a:rPr lang="de-DE" sz="1200" dirty="0"/>
+              <a:t> </a:t>
+            </a:r>
+            <a:r>
+              <a:rPr lang="de-DE" sz="1200" dirty="0" err="1"/>
+              <a:t>or</a:t>
+            </a:r>
+            <a:r>
+              <a:rPr lang="de-DE" sz="1200" dirty="0"/>
+              <a:t> save </a:t>
+            </a:r>
+            <a:r>
+              <a:rPr lang="de-DE" sz="1200" dirty="0" err="1"/>
+              <a:t>as</a:t>
+            </a:r>
+            <a:r>
+              <a:rPr lang="de-DE" sz="1200" dirty="0"/>
+              <a:t> a different </a:t>
+            </a:r>
+            <a:r>
+              <a:rPr lang="de-DE" sz="1200" dirty="0" err="1"/>
+              <a:t>filename</a:t>
+            </a:r>
+            <a:r>
+              <a:rPr lang="de-DE" sz="1200" dirty="0"/>
+              <a:t>)</a:t>
+            </a:r>
+          </a:p>
+          <a:p>
+            <a:pPr marL="228600" indent="-228600">
+              <a:buFont typeface="+mj-lt"/>
+              <a:buAutoNum type="arabicPeriod"/>
+            </a:pPr>
+            <a:r>
+              <a:rPr lang="de-DE" sz="1200" dirty="0" err="1"/>
+              <a:t>Reoopen</a:t>
+            </a:r>
+            <a:r>
+              <a:rPr lang="de-DE" sz="1200" dirty="0"/>
+              <a:t> </a:t>
+            </a:r>
+            <a:r>
+              <a:rPr lang="de-DE" sz="1200" dirty="0" err="1"/>
+              <a:t>the</a:t>
+            </a:r>
+            <a:r>
+              <a:rPr lang="de-DE" sz="1200" dirty="0"/>
+              <a:t> </a:t>
+            </a:r>
+            <a:r>
+              <a:rPr lang="de-DE" sz="1200" dirty="0" err="1"/>
+              <a:t>Infrastrucrue</a:t>
+            </a:r>
+            <a:r>
+              <a:rPr lang="de-DE" sz="1200" dirty="0"/>
+              <a:t> </a:t>
+            </a:r>
+            <a:r>
+              <a:rPr lang="de-DE" sz="1200" dirty="0" err="1"/>
+              <a:t>page</a:t>
+            </a:r>
+            <a:r>
+              <a:rPr lang="de-DE" sz="1200" dirty="0"/>
+              <a:t> (IMPORTANT!)</a:t>
+            </a:r>
+          </a:p>
+          <a:p>
+            <a:pPr marL="228600" indent="-228600">
+              <a:buFont typeface="+mj-lt"/>
+              <a:buAutoNum type="arabicPeriod"/>
+            </a:pPr>
+            <a:r>
+              <a:rPr lang="de-DE" sz="1200" dirty="0"/>
+              <a:t>Load (a </a:t>
+            </a:r>
+            <a:r>
+              <a:rPr lang="de-DE" sz="1200" dirty="0" err="1"/>
+              <a:t>or</a:t>
+            </a:r>
+            <a:r>
+              <a:rPr lang="de-DE" sz="1200" dirty="0"/>
+              <a:t> </a:t>
+            </a:r>
+            <a:r>
+              <a:rPr lang="de-DE" sz="1200" dirty="0" err="1"/>
+              <a:t>the</a:t>
+            </a:r>
+            <a:r>
+              <a:rPr lang="de-DE" sz="1200" dirty="0"/>
+              <a:t> </a:t>
+            </a:r>
+            <a:r>
+              <a:rPr lang="de-DE" sz="1200" dirty="0" err="1"/>
+              <a:t>newly</a:t>
+            </a:r>
+            <a:r>
+              <a:rPr lang="de-DE" sz="1200" dirty="0"/>
+              <a:t> </a:t>
+            </a:r>
+            <a:r>
+              <a:rPr lang="de-DE" sz="1200" dirty="0" err="1"/>
+              <a:t>saved</a:t>
+            </a:r>
+            <a:r>
+              <a:rPr lang="de-DE" sz="1200" dirty="0"/>
+              <a:t>) </a:t>
+            </a:r>
+            <a:r>
+              <a:rPr lang="de-DE" sz="1200" dirty="0" err="1"/>
+              <a:t>controllersetup</a:t>
+            </a:r>
+            <a:endParaRPr lang="de-DE" sz="1200" dirty="0"/>
+          </a:p>
+          <a:p>
+            <a:endParaRPr lang="de-DE" sz="1200" b="1" dirty="0"/>
+          </a:p>
+          <a:p>
+            <a:r>
+              <a:rPr lang="de-DE" sz="1200" b="1" dirty="0"/>
+              <a:t>SAVE </a:t>
+            </a:r>
+            <a:r>
+              <a:rPr lang="de-DE" sz="1200" b="1" dirty="0" err="1"/>
+              <a:t>the</a:t>
+            </a:r>
+            <a:r>
+              <a:rPr lang="de-DE" sz="1200" b="1" dirty="0"/>
+              <a:t> </a:t>
+            </a:r>
+            <a:r>
+              <a:rPr lang="de-DE" sz="1200" b="1" dirty="0" err="1"/>
+              <a:t>current</a:t>
+            </a:r>
+            <a:r>
+              <a:rPr lang="de-DE" sz="1200" b="1" dirty="0"/>
+              <a:t> </a:t>
+            </a:r>
+            <a:r>
+              <a:rPr lang="de-DE" sz="1200" b="1" dirty="0" err="1"/>
+              <a:t>controllerstates</a:t>
+            </a:r>
+            <a:r>
+              <a:rPr lang="de-DE" sz="1200" b="1" dirty="0"/>
+              <a:t> </a:t>
+            </a:r>
+            <a:r>
+              <a:rPr lang="de-DE" sz="1200" b="1" dirty="0" err="1"/>
+              <a:t>to</a:t>
+            </a:r>
+            <a:r>
+              <a:rPr lang="de-DE" sz="1200" b="1" dirty="0"/>
+              <a:t> a file:</a:t>
+            </a:r>
+          </a:p>
+          <a:p>
+            <a:pPr marL="228600" indent="-228600">
+              <a:buFont typeface="+mj-lt"/>
+              <a:buAutoNum type="arabicPeriod"/>
+            </a:pPr>
+            <a:r>
+              <a:rPr lang="de-DE" sz="1200" dirty="0"/>
+              <a:t>SAVE Workflow: Load </a:t>
+            </a:r>
+            <a:r>
+              <a:rPr lang="de-DE" sz="1200" dirty="0" err="1"/>
+              <a:t>the</a:t>
+            </a:r>
+            <a:r>
+              <a:rPr lang="de-DE" sz="1200" dirty="0"/>
+              <a:t> </a:t>
+            </a:r>
+            <a:r>
+              <a:rPr lang="de-DE" sz="1200" dirty="0" err="1"/>
+              <a:t>controllerstates</a:t>
+            </a:r>
+            <a:r>
+              <a:rPr lang="de-DE" sz="1200" dirty="0"/>
+              <a:t> </a:t>
+            </a:r>
+            <a:r>
+              <a:rPr lang="de-DE" sz="1200" dirty="0" err="1"/>
+              <a:t>from</a:t>
+            </a:r>
+            <a:r>
+              <a:rPr lang="de-DE" sz="1200" dirty="0"/>
+              <a:t> Controllers (IMPORTANT: ALL </a:t>
+            </a:r>
+          </a:p>
+          <a:p>
+            <a:pPr marL="228600" indent="-228600">
+              <a:buFont typeface="+mj-lt"/>
+              <a:buAutoNum type="arabicPeriod"/>
+            </a:pPr>
+            <a:r>
+              <a:rPr lang="de-DE" sz="1200" dirty="0"/>
+              <a:t>SAVE Workflow: Write </a:t>
+            </a:r>
+            <a:r>
+              <a:rPr lang="de-DE" sz="1200" dirty="0" err="1"/>
+              <a:t>Controllersstates</a:t>
+            </a:r>
+            <a:r>
+              <a:rPr lang="de-DE" sz="1200" dirty="0"/>
+              <a:t> </a:t>
+            </a:r>
+            <a:r>
+              <a:rPr lang="de-DE" sz="1200" dirty="0" err="1"/>
+              <a:t>to</a:t>
+            </a:r>
+            <a:r>
+              <a:rPr lang="de-DE" sz="1200" dirty="0"/>
+              <a:t> a </a:t>
+            </a:r>
+            <a:r>
+              <a:rPr lang="de-DE" sz="1200" dirty="0" err="1"/>
+              <a:t>file</a:t>
+            </a:r>
+            <a:endParaRPr lang="de-DE" sz="1200" dirty="0"/>
+          </a:p>
+          <a:p>
+            <a:endParaRPr lang="de-DE" sz="1200" b="1" dirty="0"/>
+          </a:p>
+          <a:p>
+            <a:r>
+              <a:rPr lang="de-DE" sz="1200" b="1" dirty="0"/>
+              <a:t>RECALL </a:t>
+            </a:r>
+            <a:r>
+              <a:rPr lang="de-DE" sz="1200" b="1" dirty="0" err="1"/>
+              <a:t>the</a:t>
+            </a:r>
+            <a:r>
+              <a:rPr lang="de-DE" sz="1200" b="1" dirty="0"/>
+              <a:t> </a:t>
+            </a:r>
+            <a:r>
+              <a:rPr lang="de-DE" sz="1200" b="1" dirty="0" err="1"/>
+              <a:t>current</a:t>
+            </a:r>
+            <a:r>
+              <a:rPr lang="de-DE" sz="1200" b="1" dirty="0"/>
+              <a:t> </a:t>
+            </a:r>
+            <a:r>
+              <a:rPr lang="de-DE" sz="1200" b="1" dirty="0" err="1"/>
+              <a:t>controllerstates</a:t>
+            </a:r>
+            <a:r>
+              <a:rPr lang="de-DE" sz="1200" b="1" dirty="0"/>
+              <a:t> </a:t>
+            </a:r>
+            <a:r>
+              <a:rPr lang="de-DE" sz="1200" b="1" dirty="0" err="1"/>
+              <a:t>to</a:t>
+            </a:r>
+            <a:r>
+              <a:rPr lang="de-DE" sz="1200" b="1" dirty="0"/>
+              <a:t> a file:</a:t>
+            </a:r>
+          </a:p>
+          <a:p>
+            <a:pPr marL="228600" indent="-228600">
+              <a:buFont typeface="+mj-lt"/>
+              <a:buAutoNum type="arabicPeriod"/>
+            </a:pPr>
+            <a:r>
+              <a:rPr lang="de-DE" sz="1200" dirty="0"/>
+              <a:t>RECALL Workflow: Load </a:t>
+            </a:r>
+            <a:r>
+              <a:rPr lang="de-DE" sz="1200" dirty="0" err="1"/>
+              <a:t>Controllerstates</a:t>
+            </a:r>
+            <a:r>
+              <a:rPr lang="de-DE" sz="1200" dirty="0"/>
+              <a:t> </a:t>
+            </a:r>
+            <a:r>
+              <a:rPr lang="de-DE" sz="1200" dirty="0" err="1"/>
+              <a:t>from</a:t>
+            </a:r>
+            <a:r>
+              <a:rPr lang="de-DE" sz="1200" dirty="0"/>
+              <a:t> a </a:t>
+            </a:r>
+            <a:r>
+              <a:rPr lang="de-DE" sz="1200" dirty="0" err="1"/>
+              <a:t>file</a:t>
+            </a:r>
+            <a:endParaRPr lang="de-DE" sz="1200" dirty="0"/>
+          </a:p>
+          <a:p>
+            <a:pPr marL="228600" indent="-228600">
+              <a:buFont typeface="+mj-lt"/>
+              <a:buAutoNum type="arabicPeriod"/>
+            </a:pPr>
+            <a:r>
+              <a:rPr lang="de-DE" sz="1200" dirty="0"/>
+              <a:t>RECALL Workflow: Write </a:t>
+            </a:r>
+            <a:r>
+              <a:rPr lang="de-DE" sz="1200" dirty="0" err="1"/>
+              <a:t>Controllerstates</a:t>
+            </a:r>
+            <a:r>
+              <a:rPr lang="de-DE" sz="1200" dirty="0"/>
+              <a:t> back </a:t>
+            </a:r>
+            <a:r>
+              <a:rPr lang="de-DE" sz="1200" dirty="0" err="1"/>
+              <a:t>to</a:t>
+            </a:r>
+            <a:r>
+              <a:rPr lang="de-DE" sz="1200" dirty="0"/>
+              <a:t> </a:t>
+            </a:r>
+            <a:r>
+              <a:rPr lang="de-DE" sz="1200" dirty="0" err="1"/>
+              <a:t>the</a:t>
+            </a:r>
+            <a:r>
+              <a:rPr lang="de-DE" sz="1200" dirty="0"/>
+              <a:t> </a:t>
+            </a:r>
+            <a:r>
+              <a:rPr lang="de-DE" sz="1200" dirty="0" err="1"/>
+              <a:t>controllers</a:t>
+            </a:r>
+            <a:endParaRPr lang="de-DE" sz="1200" dirty="0"/>
+          </a:p>
+        </p:txBody>
+      </p:sp>
+      <p:pic>
+        <p:nvPicPr>
+          <p:cNvPr id="5" name="Grafik 4">
+            <a:extLst>
+              <a:ext uri="{FF2B5EF4-FFF2-40B4-BE49-F238E27FC236}">
+                <a16:creationId xmlns:a16="http://schemas.microsoft.com/office/drawing/2014/main" id="{8C5B44A8-4536-4FAA-94E0-05A7B42A1D91}"/>
+              </a:ext>
+            </a:extLst>
+          </p:cNvPr>
+          <p:cNvPicPr>
+            <a:picLocks noChangeAspect="1"/>
+          </p:cNvPicPr>
+          <p:nvPr/>
+        </p:nvPicPr>
+        <p:blipFill>
+          <a:blip r:embed="rId3"/>
+          <a:stretch>
+            <a:fillRect/>
+          </a:stretch>
+        </p:blipFill>
+        <p:spPr>
+          <a:xfrm>
+            <a:off x="2129365" y="5122265"/>
+            <a:ext cx="1795842" cy="1316951"/>
+          </a:xfrm>
+          <a:prstGeom prst="rect">
+            <a:avLst/>
+          </a:prstGeom>
+        </p:spPr>
+      </p:pic>
+      <p:sp>
+        <p:nvSpPr>
+          <p:cNvPr id="6" name="Textfeld 5">
+            <a:extLst>
+              <a:ext uri="{FF2B5EF4-FFF2-40B4-BE49-F238E27FC236}">
+                <a16:creationId xmlns:a16="http://schemas.microsoft.com/office/drawing/2014/main" id="{5D1B2968-6C65-4D40-B930-402D1AFD623A}"/>
+              </a:ext>
+            </a:extLst>
+          </p:cNvPr>
+          <p:cNvSpPr txBox="1"/>
+          <p:nvPr/>
+        </p:nvSpPr>
+        <p:spPr>
+          <a:xfrm>
+            <a:off x="3925207" y="5110343"/>
+            <a:ext cx="4707466" cy="1384995"/>
+          </a:xfrm>
+          <a:prstGeom prst="rect">
+            <a:avLst/>
+          </a:prstGeom>
+          <a:noFill/>
+        </p:spPr>
+        <p:txBody>
+          <a:bodyPr wrap="square" rtlCol="0">
+            <a:spAutoFit/>
+          </a:bodyPr>
+          <a:lstStyle/>
+          <a:p>
+            <a:r>
+              <a:rPr lang="de-DE" sz="1200" b="1" dirty="0">
+                <a:solidFill>
+                  <a:srgbClr val="FF0000"/>
+                </a:solidFill>
+              </a:rPr>
+              <a:t>Possible </a:t>
+            </a:r>
+            <a:r>
+              <a:rPr lang="de-DE" sz="1200" b="1" dirty="0" err="1">
+                <a:solidFill>
+                  <a:srgbClr val="FF0000"/>
+                </a:solidFill>
+              </a:rPr>
+              <a:t>problems</a:t>
+            </a:r>
+            <a:r>
+              <a:rPr lang="de-DE" sz="1200" b="1" dirty="0">
+                <a:solidFill>
+                  <a:srgbClr val="FF0000"/>
+                </a:solidFill>
+              </a:rPr>
+              <a:t> </a:t>
+            </a:r>
+            <a:r>
+              <a:rPr lang="de-DE" sz="1200" b="1" dirty="0" err="1">
+                <a:solidFill>
+                  <a:srgbClr val="FF0000"/>
+                </a:solidFill>
+              </a:rPr>
+              <a:t>are</a:t>
+            </a:r>
+            <a:r>
+              <a:rPr lang="de-DE" sz="1200" b="1" dirty="0">
+                <a:solidFill>
+                  <a:srgbClr val="FF0000"/>
+                </a:solidFill>
+              </a:rPr>
+              <a:t> all </a:t>
+            </a:r>
+            <a:r>
+              <a:rPr lang="de-DE" sz="1200" b="1" dirty="0" err="1">
+                <a:solidFill>
+                  <a:srgbClr val="FF0000"/>
+                </a:solidFill>
+              </a:rPr>
+              <a:t>related</a:t>
+            </a:r>
+            <a:r>
+              <a:rPr lang="de-DE" sz="1200" b="1" dirty="0">
+                <a:solidFill>
+                  <a:srgbClr val="FF0000"/>
+                </a:solidFill>
+              </a:rPr>
+              <a:t> </a:t>
+            </a:r>
+            <a:r>
+              <a:rPr lang="de-DE" sz="1200" b="1" dirty="0" err="1">
+                <a:solidFill>
+                  <a:srgbClr val="FF0000"/>
+                </a:solidFill>
+              </a:rPr>
+              <a:t>that</a:t>
+            </a:r>
+            <a:r>
+              <a:rPr lang="de-DE" sz="1200" b="1" dirty="0">
+                <a:solidFill>
+                  <a:srgbClr val="FF0000"/>
+                </a:solidFill>
+              </a:rPr>
+              <a:t> </a:t>
+            </a:r>
+            <a:r>
+              <a:rPr lang="de-DE" sz="1200" b="1" dirty="0" err="1">
+                <a:solidFill>
+                  <a:srgbClr val="FF0000"/>
+                </a:solidFill>
+              </a:rPr>
+              <a:t>to</a:t>
+            </a:r>
+            <a:r>
+              <a:rPr lang="de-DE" sz="1200" b="1" dirty="0">
+                <a:solidFill>
+                  <a:srgbClr val="FF0000"/>
+                </a:solidFill>
+              </a:rPr>
+              <a:t> </a:t>
+            </a:r>
+            <a:r>
+              <a:rPr lang="de-DE" sz="1200" b="1" dirty="0" err="1">
+                <a:solidFill>
+                  <a:srgbClr val="FF0000"/>
+                </a:solidFill>
+              </a:rPr>
+              <a:t>the</a:t>
+            </a:r>
+            <a:r>
+              <a:rPr lang="de-DE" sz="1200" b="1" dirty="0">
+                <a:solidFill>
+                  <a:srgbClr val="FF0000"/>
+                </a:solidFill>
+              </a:rPr>
+              <a:t> </a:t>
+            </a:r>
+            <a:r>
+              <a:rPr lang="de-DE" sz="1200" b="1" dirty="0" err="1">
+                <a:solidFill>
+                  <a:srgbClr val="FF0000"/>
+                </a:solidFill>
+              </a:rPr>
+              <a:t>only</a:t>
+            </a:r>
+            <a:r>
+              <a:rPr lang="de-DE" sz="1200" b="1" dirty="0">
+                <a:solidFill>
+                  <a:srgbClr val="FF0000"/>
+                </a:solidFill>
+              </a:rPr>
+              <a:t> </a:t>
+            </a:r>
+            <a:r>
+              <a:rPr lang="de-DE" sz="1200" b="1" dirty="0" err="1">
+                <a:solidFill>
+                  <a:srgbClr val="FF0000"/>
+                </a:solidFill>
+              </a:rPr>
+              <a:t>reason</a:t>
+            </a:r>
+            <a:r>
+              <a:rPr lang="de-DE" sz="1200" b="1" dirty="0">
+                <a:solidFill>
+                  <a:srgbClr val="FF0000"/>
+                </a:solidFill>
+              </a:rPr>
+              <a:t>: ONE </a:t>
+            </a:r>
+            <a:r>
+              <a:rPr lang="de-DE" sz="1200" b="1" dirty="0" err="1">
+                <a:solidFill>
+                  <a:srgbClr val="FF0000"/>
+                </a:solidFill>
+              </a:rPr>
+              <a:t>or</a:t>
+            </a:r>
+            <a:r>
+              <a:rPr lang="de-DE" sz="1200" b="1" dirty="0">
+                <a:solidFill>
+                  <a:srgbClr val="FF0000"/>
+                </a:solidFill>
+              </a:rPr>
+              <a:t> </a:t>
+            </a:r>
+            <a:r>
+              <a:rPr lang="de-DE" sz="1200" b="1" dirty="0" err="1">
+                <a:solidFill>
+                  <a:srgbClr val="FF0000"/>
+                </a:solidFill>
+              </a:rPr>
+              <a:t>more</a:t>
+            </a:r>
+            <a:r>
+              <a:rPr lang="de-DE" sz="1200" b="1" dirty="0">
+                <a:solidFill>
+                  <a:srgbClr val="FF0000"/>
+                </a:solidFill>
+              </a:rPr>
+              <a:t> OF YOUR CONTROLLERS IS/</a:t>
+            </a:r>
+            <a:r>
+              <a:rPr lang="de-DE" sz="1200" b="1" dirty="0" err="1">
+                <a:solidFill>
+                  <a:srgbClr val="FF0000"/>
+                </a:solidFill>
+              </a:rPr>
+              <a:t>are</a:t>
+            </a:r>
+            <a:r>
+              <a:rPr lang="de-DE" sz="1200" b="1" dirty="0">
+                <a:solidFill>
+                  <a:srgbClr val="FF0000"/>
+                </a:solidFill>
+              </a:rPr>
+              <a:t> OFFLINE!!!</a:t>
+            </a:r>
+          </a:p>
+          <a:p>
+            <a:endParaRPr lang="de-DE" sz="1200" dirty="0"/>
+          </a:p>
+          <a:p>
+            <a:r>
+              <a:rPr lang="de-DE" sz="1200" b="1" dirty="0" err="1"/>
+              <a:t>You</a:t>
+            </a:r>
+            <a:r>
+              <a:rPr lang="de-DE" sz="1200" b="1" dirty="0"/>
+              <a:t> will </a:t>
+            </a:r>
+            <a:r>
+              <a:rPr lang="de-DE" sz="1200" b="1" dirty="0" err="1"/>
+              <a:t>identify</a:t>
+            </a:r>
+            <a:r>
+              <a:rPr lang="de-DE" sz="1200" b="1" dirty="0"/>
+              <a:t> </a:t>
+            </a:r>
+            <a:r>
+              <a:rPr lang="de-DE" sz="1200" b="1" dirty="0" err="1"/>
+              <a:t>this</a:t>
+            </a:r>
+            <a:r>
+              <a:rPr lang="de-DE" sz="1200" b="1" dirty="0"/>
+              <a:t> </a:t>
+            </a:r>
+            <a:r>
+              <a:rPr lang="de-DE" sz="1200" b="1" dirty="0" err="1"/>
+              <a:t>problem</a:t>
+            </a:r>
+            <a:r>
+              <a:rPr lang="de-DE" sz="1200" b="1" dirty="0"/>
+              <a:t> </a:t>
+            </a:r>
+            <a:r>
+              <a:rPr lang="de-DE" sz="1200" b="1" dirty="0" err="1"/>
+              <a:t>by</a:t>
+            </a:r>
+            <a:r>
+              <a:rPr lang="de-DE" sz="1200" b="1" dirty="0"/>
+              <a:t>:</a:t>
+            </a:r>
+          </a:p>
+          <a:p>
+            <a:pPr marL="171450" indent="-171450">
+              <a:buFont typeface="Arial" panose="020B0604020202020204" pitchFamily="34" charset="0"/>
+              <a:buChar char="•"/>
+            </a:pPr>
+            <a:r>
+              <a:rPr lang="de-DE" sz="1200" dirty="0" err="1"/>
+              <a:t>click</a:t>
+            </a:r>
+            <a:r>
+              <a:rPr lang="de-DE" sz="1200" dirty="0"/>
+              <a:t> </a:t>
+            </a:r>
+            <a:r>
+              <a:rPr lang="de-DE" sz="1200" dirty="0" err="1"/>
+              <a:t>to</a:t>
+            </a:r>
+            <a:r>
+              <a:rPr lang="de-DE" sz="1200" dirty="0"/>
+              <a:t> „Load </a:t>
+            </a:r>
+            <a:r>
+              <a:rPr lang="de-DE" sz="1200" dirty="0" err="1"/>
+              <a:t>controllerstates</a:t>
+            </a:r>
+            <a:r>
+              <a:rPr lang="de-DE" sz="1200" dirty="0"/>
+              <a:t>…“ </a:t>
+            </a:r>
+            <a:r>
+              <a:rPr lang="de-DE" sz="1200" dirty="0" err="1"/>
+              <a:t>takes</a:t>
+            </a:r>
+            <a:r>
+              <a:rPr lang="de-DE" sz="1200" dirty="0"/>
+              <a:t> </a:t>
+            </a:r>
+            <a:r>
+              <a:rPr lang="de-DE" sz="1200" dirty="0" err="1"/>
+              <a:t>long</a:t>
+            </a:r>
+            <a:r>
+              <a:rPr lang="de-DE" sz="1200" dirty="0"/>
+              <a:t> </a:t>
+            </a:r>
+            <a:r>
+              <a:rPr lang="de-DE" sz="1200" dirty="0" err="1"/>
+              <a:t>to</a:t>
+            </a:r>
+            <a:r>
+              <a:rPr lang="de-DE" sz="1200" dirty="0"/>
+              <a:t> </a:t>
+            </a:r>
+            <a:r>
+              <a:rPr lang="de-DE" sz="1200" dirty="0" err="1"/>
+              <a:t>display</a:t>
+            </a:r>
+            <a:r>
+              <a:rPr lang="de-DE" sz="1200" dirty="0"/>
+              <a:t> </a:t>
+            </a:r>
+            <a:r>
+              <a:rPr lang="de-DE" sz="1200" dirty="0" err="1"/>
+              <a:t>something</a:t>
+            </a:r>
+            <a:r>
+              <a:rPr lang="de-DE" sz="1200" dirty="0"/>
+              <a:t> in </a:t>
+            </a:r>
+            <a:r>
+              <a:rPr lang="de-DE" sz="1200" dirty="0" err="1"/>
+              <a:t>the</a:t>
+            </a:r>
+            <a:r>
+              <a:rPr lang="de-DE" sz="1200" dirty="0"/>
+              <a:t> </a:t>
+            </a:r>
+            <a:r>
+              <a:rPr lang="de-DE" sz="1200" dirty="0" err="1"/>
+              <a:t>editor</a:t>
+            </a:r>
+            <a:endParaRPr lang="de-DE" sz="1200" dirty="0"/>
+          </a:p>
+          <a:p>
+            <a:pPr marL="171450" indent="-171450">
+              <a:buFont typeface="Arial" panose="020B0604020202020204" pitchFamily="34" charset="0"/>
+              <a:buChar char="•"/>
+            </a:pPr>
+            <a:r>
+              <a:rPr lang="de-DE" sz="1200" dirty="0" err="1"/>
+              <a:t>One</a:t>
+            </a:r>
+            <a:r>
+              <a:rPr lang="de-DE" sz="1200" dirty="0"/>
+              <a:t> </a:t>
+            </a:r>
+            <a:r>
+              <a:rPr lang="de-DE" sz="1200" dirty="0" err="1"/>
+              <a:t>or</a:t>
+            </a:r>
+            <a:r>
+              <a:rPr lang="de-DE" sz="1200" dirty="0"/>
+              <a:t> </a:t>
+            </a:r>
+            <a:r>
+              <a:rPr lang="de-DE" sz="1200" dirty="0" err="1"/>
+              <a:t>more</a:t>
+            </a:r>
+            <a:r>
+              <a:rPr lang="de-DE" sz="1200" dirty="0"/>
+              <a:t> </a:t>
+            </a:r>
+            <a:r>
+              <a:rPr lang="de-DE" sz="1200" dirty="0" err="1"/>
+              <a:t>controllers</a:t>
+            </a:r>
+            <a:r>
+              <a:rPr lang="de-DE" sz="1200" dirty="0"/>
+              <a:t> </a:t>
+            </a:r>
+            <a:r>
+              <a:rPr lang="de-DE" sz="1200" dirty="0" err="1"/>
+              <a:t>display</a:t>
+            </a:r>
+            <a:r>
+              <a:rPr lang="de-DE" sz="1200" dirty="0"/>
+              <a:t> „</a:t>
+            </a:r>
+            <a:r>
+              <a:rPr lang="de-DE" sz="1200" dirty="0" err="1"/>
+              <a:t>undefined</a:t>
+            </a:r>
+            <a:r>
+              <a:rPr lang="de-DE" sz="1200" dirty="0"/>
+              <a:t>“ </a:t>
+            </a:r>
+            <a:r>
+              <a:rPr lang="de-DE" sz="1200" dirty="0" err="1"/>
+              <a:t>as</a:t>
+            </a:r>
+            <a:r>
+              <a:rPr lang="de-DE" sz="1200" dirty="0"/>
+              <a:t> </a:t>
+            </a:r>
+            <a:r>
+              <a:rPr lang="de-DE" sz="1200" dirty="0" err="1"/>
+              <a:t>their</a:t>
+            </a:r>
+            <a:r>
+              <a:rPr lang="de-DE" sz="1200" dirty="0"/>
+              <a:t> </a:t>
+            </a:r>
+            <a:r>
+              <a:rPr lang="de-DE" sz="1200" dirty="0" err="1"/>
+              <a:t>status</a:t>
+            </a:r>
+            <a:r>
+              <a:rPr lang="de-DE" sz="1200" dirty="0"/>
+              <a:t>!</a:t>
+            </a:r>
+          </a:p>
+        </p:txBody>
+      </p:sp>
+      <p:pic>
+        <p:nvPicPr>
+          <p:cNvPr id="8" name="Grafik 7">
+            <a:extLst>
+              <a:ext uri="{FF2B5EF4-FFF2-40B4-BE49-F238E27FC236}">
+                <a16:creationId xmlns:a16="http://schemas.microsoft.com/office/drawing/2014/main" id="{E84C07A7-F5F0-40A6-9A9D-227D1AC9AB20}"/>
+              </a:ext>
+            </a:extLst>
+          </p:cNvPr>
+          <p:cNvPicPr>
+            <a:picLocks noChangeAspect="1"/>
+          </p:cNvPicPr>
+          <p:nvPr/>
+        </p:nvPicPr>
+        <p:blipFill>
+          <a:blip r:embed="rId4"/>
+          <a:stretch>
+            <a:fillRect/>
+          </a:stretch>
+        </p:blipFill>
+        <p:spPr>
+          <a:xfrm>
+            <a:off x="10332190" y="1695094"/>
+            <a:ext cx="1859810" cy="1114067"/>
+          </a:xfrm>
+          <a:prstGeom prst="rect">
+            <a:avLst/>
+          </a:prstGeom>
+        </p:spPr>
+      </p:pic>
+      <p:pic>
+        <p:nvPicPr>
+          <p:cNvPr id="10" name="Grafik 9">
+            <a:extLst>
+              <a:ext uri="{FF2B5EF4-FFF2-40B4-BE49-F238E27FC236}">
+                <a16:creationId xmlns:a16="http://schemas.microsoft.com/office/drawing/2014/main" id="{DEEDB0F3-7C0B-40B9-8697-9FD301632918}"/>
+              </a:ext>
+            </a:extLst>
+          </p:cNvPr>
+          <p:cNvPicPr>
+            <a:picLocks noChangeAspect="1"/>
+          </p:cNvPicPr>
+          <p:nvPr/>
+        </p:nvPicPr>
+        <p:blipFill>
+          <a:blip r:embed="rId5"/>
+          <a:stretch>
+            <a:fillRect/>
+          </a:stretch>
+        </p:blipFill>
+        <p:spPr>
+          <a:xfrm>
+            <a:off x="10332190" y="2858215"/>
+            <a:ext cx="1859810" cy="696037"/>
+          </a:xfrm>
+          <a:prstGeom prst="rect">
+            <a:avLst/>
+          </a:prstGeom>
+        </p:spPr>
+      </p:pic>
+      <p:pic>
+        <p:nvPicPr>
+          <p:cNvPr id="12" name="Grafik 11">
+            <a:extLst>
+              <a:ext uri="{FF2B5EF4-FFF2-40B4-BE49-F238E27FC236}">
+                <a16:creationId xmlns:a16="http://schemas.microsoft.com/office/drawing/2014/main" id="{A469C8D6-90BB-47CB-9C18-3ECBAB127606}"/>
+              </a:ext>
+            </a:extLst>
+          </p:cNvPr>
+          <p:cNvPicPr>
+            <a:picLocks noChangeAspect="1"/>
+          </p:cNvPicPr>
+          <p:nvPr/>
+        </p:nvPicPr>
+        <p:blipFill>
+          <a:blip r:embed="rId6"/>
+          <a:stretch>
+            <a:fillRect/>
+          </a:stretch>
+        </p:blipFill>
+        <p:spPr>
+          <a:xfrm>
+            <a:off x="8768180" y="3666945"/>
+            <a:ext cx="3422732" cy="309150"/>
+          </a:xfrm>
+          <a:prstGeom prst="rect">
+            <a:avLst/>
+          </a:prstGeom>
+        </p:spPr>
+      </p:pic>
+      <p:pic>
+        <p:nvPicPr>
+          <p:cNvPr id="15" name="Grafik 14">
+            <a:extLst>
+              <a:ext uri="{FF2B5EF4-FFF2-40B4-BE49-F238E27FC236}">
+                <a16:creationId xmlns:a16="http://schemas.microsoft.com/office/drawing/2014/main" id="{BB44AFBA-DD21-44CC-90CF-F8AD19128EFC}"/>
+              </a:ext>
+            </a:extLst>
+          </p:cNvPr>
+          <p:cNvPicPr>
+            <a:picLocks noChangeAspect="1"/>
+          </p:cNvPicPr>
+          <p:nvPr/>
+        </p:nvPicPr>
+        <p:blipFill>
+          <a:blip r:embed="rId7"/>
+          <a:stretch>
+            <a:fillRect/>
+          </a:stretch>
+        </p:blipFill>
+        <p:spPr>
+          <a:xfrm>
+            <a:off x="8768180" y="4099681"/>
+            <a:ext cx="3423820" cy="346662"/>
+          </a:xfrm>
+          <a:prstGeom prst="rect">
+            <a:avLst/>
+          </a:prstGeom>
+        </p:spPr>
+      </p:pic>
+    </p:spTree>
+    <p:extLst>
+      <p:ext uri="{BB962C8B-B14F-4D97-AF65-F5344CB8AC3E}">
+        <p14:creationId xmlns:p14="http://schemas.microsoft.com/office/powerpoint/2010/main" val="1563686693"/>
+      </p:ext>
+    </p:extLst>
+  </p:cSld>
+  <p:clrMapOvr>
+    <a:masterClrMapping/>
+  </p:clrMapOvr>
+</p:sld>
+</file>
+
+<file path=ppt/slides/slide23.xml><?xml version="1.0" encoding="utf-8"?>
 <p:sld xmlns:a="http://schemas.openxmlformats.org/drawingml/2006/main" xmlns:r="http://schemas.openxmlformats.org/officeDocument/2006/relationships" xmlns:p="http://schemas.openxmlformats.org/presentationml/2006/main">
   <p:cSld>
     <p:spTree>

</xml_diff>